<commit_message>
docs: done slot 3
</commit_message>
<xml_diff>
--- a/slide/1.5 Understand Convolutional Neural Networks in TensorFlow.pptx
+++ b/slide/1.5 Understand Convolutional Neural Networks in TensorFlow.pptx
@@ -284,7 +284,7 @@
       </p15:sldGuideLst>
     </p:ext>
     <p:ext uri="GoogleSlidesCustomDataVersion2">
-      <go:slidesCustomData xmlns:go="http://customooxmlschemas.google.com/" xmlns:ahyp="http://schemas.microsoft.com/office/drawing/2018/hyperlinkcolor" xmlns:p15="http://schemas.microsoft.com/office/powerpoint/2012/main" xmlns:p14="http://schemas.microsoft.com/office/powerpoint/2010/main" xmlns:com="http://schemas.openxmlformats.org/drawingml/2006/compatibility" xmlns:pvml="urn:schemas-microsoft-com:office:powerpoint" xmlns:v="urn:schemas-microsoft-com:vml" xmlns:o="urn:schemas-microsoft-com:office:office" xmlns:dgm="http://schemas.openxmlformats.org/drawingml/2006/diagram" xmlns:c="http://schemas.openxmlformats.org/drawingml/2006/chart" xmlns:mv="urn:schemas-microsoft-com:mac:vml" xmlns:mc="http://schemas.openxmlformats.org/markup-compatibility/2006" xmlns="" r:id="rId24" roundtripDataSignature="AMtx7miBV+73paNyiN1hkrB0B/SqUbOrZA=="/>
+      <go:slidesCustomData xmlns="" xmlns:mc="http://schemas.openxmlformats.org/markup-compatibility/2006" xmlns:mv="urn:schemas-microsoft-com:mac:vml" xmlns:c="http://schemas.openxmlformats.org/drawingml/2006/chart" xmlns:dgm="http://schemas.openxmlformats.org/drawingml/2006/diagram" xmlns:o="urn:schemas-microsoft-com:office:office" xmlns:v="urn:schemas-microsoft-com:vml" xmlns:pvml="urn:schemas-microsoft-com:office:powerpoint" xmlns:com="http://schemas.openxmlformats.org/drawingml/2006/compatibility" xmlns:p14="http://schemas.microsoft.com/office/powerpoint/2010/main" xmlns:p15="http://schemas.microsoft.com/office/powerpoint/2012/main" xmlns:ahyp="http://schemas.microsoft.com/office/drawing/2018/hyperlinkcolor" xmlns:go="http://customooxmlschemas.google.com/" r:id="rId24" roundtripDataSignature="AMtx7miBV+73paNyiN1hkrB0B/SqUbOrZA=="/>
     </p:ext>
   </p:extLst>
 </p:presentation>
@@ -1691,7 +1691,7 @@
         </p:nvSpPr>
         <p:spPr>
           <a:xfrm>
-            <a:off x="1255712" y="720725"/>
+            <a:off x="1255713" y="720725"/>
             <a:ext cx="4792662" cy="3594100"/>
           </a:xfrm>
           <a:custGeom>
@@ -16958,7 +16958,7 @@
               <a:buNone/>
             </a:pPr>
             <a:r>
-              <a:rPr lang="en-US" sz="4000" b="0" i="0" u="none">
+              <a:rPr lang="en-US" sz="4000" b="0" i="0" u="none" dirty="0">
                 <a:solidFill>
                   <a:schemeClr val="dk2"/>
                 </a:solidFill>
@@ -16969,7 +16969,7 @@
               </a:rPr>
               <a:t>Fashion classifier with convolutions</a:t>
             </a:r>
-            <a:endParaRPr/>
+            <a:endParaRPr dirty="0"/>
           </a:p>
         </p:txBody>
       </p:sp>
@@ -17194,6 +17194,45 @@
           </a:ln>
         </p:spPr>
       </p:pic>
+      <p:sp>
+        <p:nvSpPr>
+          <p:cNvPr id="2" name="TextBox 1">
+            <a:extLst>
+              <a:ext uri="{FF2B5EF4-FFF2-40B4-BE49-F238E27FC236}">
+                <a16:creationId xmlns:a16="http://schemas.microsoft.com/office/drawing/2014/main" id="{65C26733-E00A-942A-FE01-92D1248EBD4C}"/>
+              </a:ext>
+            </a:extLst>
+          </p:cNvPr>
+          <p:cNvSpPr txBox="1"/>
+          <p:nvPr/>
+        </p:nvSpPr>
+        <p:spPr>
+          <a:xfrm>
+            <a:off x="5101772" y="5254625"/>
+            <a:ext cx="1487714" cy="307777"/>
+          </a:xfrm>
+          <a:prstGeom prst="rect">
+            <a:avLst/>
+          </a:prstGeom>
+          <a:noFill/>
+        </p:spPr>
+        <p:txBody>
+          <a:bodyPr wrap="square" rtlCol="0">
+            <a:spAutoFit/>
+          </a:bodyPr>
+          <a:lstStyle/>
+          <a:p>
+            <a:r>
+              <a:rPr lang="en-US" dirty="0"/>
+              <a:t>,V</a:t>
+            </a:r>
+            <a:r>
+              <a:rPr lang="en-VN" dirty="0"/>
+              <a:t>erbose =1</a:t>
+            </a:r>
+          </a:p>
+        </p:txBody>
+      </p:sp>
     </p:spTree>
   </p:cSld>
   <p:clrMapOvr>
@@ -18002,7 +18041,7 @@
               <a:buChar char="❑"/>
             </a:pPr>
             <a:r>
-              <a:rPr lang="en-US" sz="2000" b="0" i="0" u="none">
+              <a:rPr lang="en-US" sz="2000" b="0" i="0" u="none" dirty="0">
                 <a:solidFill>
                   <a:schemeClr val="dk1"/>
                 </a:solidFill>
@@ -18013,7 +18052,7 @@
               </a:rPr>
               <a:t>Neural Network</a:t>
             </a:r>
-            <a:endParaRPr/>
+            <a:endParaRPr dirty="0"/>
           </a:p>
           <a:p>
             <a:pPr marL="342900" lvl="0" indent="-266700" algn="l" rtl="0">
@@ -18033,7 +18072,7 @@
               <a:buFont typeface="Noto Sans Symbols"/>
               <a:buNone/>
             </a:pPr>
-            <a:endParaRPr sz="2000" b="0" i="0" u="none">
+            <a:endParaRPr sz="2000" b="0" i="0" u="none" dirty="0">
               <a:solidFill>
                 <a:schemeClr val="dk1"/>
               </a:solidFill>
@@ -18061,7 +18100,7 @@
               <a:buFont typeface="Noto Sans Symbols"/>
               <a:buNone/>
             </a:pPr>
-            <a:endParaRPr sz="2000" b="0" i="0" u="none">
+            <a:endParaRPr sz="2000" b="0" i="0" u="none" dirty="0">
               <a:solidFill>
                 <a:schemeClr val="dk1"/>
               </a:solidFill>
@@ -18090,7 +18129,7 @@
               <a:buChar char="❑"/>
             </a:pPr>
             <a:r>
-              <a:rPr lang="en-US" sz="2000" b="0" i="0" u="none">
+              <a:rPr lang="en-US" sz="2000" b="0" i="0" u="none" dirty="0">
                 <a:solidFill>
                   <a:schemeClr val="dk1"/>
                 </a:solidFill>
@@ -18101,7 +18140,7 @@
               </a:rPr>
               <a:t>Convolutional Neural Network</a:t>
             </a:r>
-            <a:endParaRPr/>
+            <a:endParaRPr dirty="0"/>
           </a:p>
           <a:p>
             <a:pPr marL="342900" lvl="0" indent="-266700" algn="l" rtl="0">
@@ -18121,7 +18160,7 @@
               <a:buFont typeface="Noto Sans Symbols"/>
               <a:buNone/>
             </a:pPr>
-            <a:endParaRPr sz="2000" b="0" i="0" u="none">
+            <a:endParaRPr sz="2000" b="0" i="0" u="none" dirty="0">
               <a:solidFill>
                 <a:schemeClr val="dk1"/>
               </a:solidFill>
@@ -18149,7 +18188,7 @@
               <a:buFont typeface="Noto Sans Symbols"/>
               <a:buNone/>
             </a:pPr>
-            <a:endParaRPr sz="2000"/>
+            <a:endParaRPr sz="2000" dirty="0"/>
           </a:p>
           <a:p>
             <a:pPr marL="342900" lvl="0" indent="-266700" algn="l" rtl="0">
@@ -18169,7 +18208,7 @@
               <a:buFont typeface="Noto Sans Symbols"/>
               <a:buNone/>
             </a:pPr>
-            <a:endParaRPr sz="2000"/>
+            <a:endParaRPr sz="2000" dirty="0"/>
           </a:p>
           <a:p>
             <a:pPr marL="342900" lvl="0" indent="-342900" algn="l" rtl="0">
@@ -18190,7 +18229,7 @@
               <a:buChar char="❑"/>
             </a:pPr>
             <a:r>
-              <a:rPr lang="en-US" sz="2000" b="0" i="0" u="none">
+              <a:rPr lang="en-US" sz="2000" b="0" i="0" u="none" dirty="0">
                 <a:solidFill>
                   <a:srgbClr val="FF0000"/>
                 </a:solidFill>
@@ -18201,7 +18240,7 @@
               </a:rPr>
               <a:t>Discuss and give your opinions.</a:t>
             </a:r>
-            <a:endParaRPr>
+            <a:endParaRPr dirty="0">
               <a:solidFill>
                 <a:srgbClr val="FF0000"/>
               </a:solidFill>
@@ -20424,7 +20463,7 @@
               <a:buChar char="❑"/>
             </a:pPr>
             <a:r>
-              <a:rPr lang="en-US" sz="2000" b="0" i="0" u="none">
+              <a:rPr lang="en-US" sz="2000" b="0" i="0" u="none" dirty="0">
                 <a:solidFill>
                   <a:schemeClr val="dk1"/>
                 </a:solidFill>
@@ -20435,7 +20474,7 @@
               </a:rPr>
               <a:t>Pooling is a way of compressing an image</a:t>
             </a:r>
-            <a:endParaRPr/>
+            <a:endParaRPr dirty="0"/>
           </a:p>
           <a:p>
             <a:pPr marL="342900" lvl="0" indent="-266700" algn="l" rtl="0">
@@ -20455,7 +20494,7 @@
               <a:buFont typeface="Noto Sans Symbols"/>
               <a:buNone/>
             </a:pPr>
-            <a:endParaRPr sz="2000" b="0" i="0" u="none">
+            <a:endParaRPr sz="2000" b="0" i="0" u="none" dirty="0">
               <a:solidFill>
                 <a:schemeClr val="dk1"/>
               </a:solidFill>
@@ -20483,7 +20522,7 @@
               <a:buFont typeface="Noto Sans Symbols"/>
               <a:buNone/>
             </a:pPr>
-            <a:endParaRPr sz="2000" b="0" i="0" u="none">
+            <a:endParaRPr sz="2000" b="0" i="0" u="none" dirty="0">
               <a:solidFill>
                 <a:schemeClr val="dk1"/>
               </a:solidFill>
@@ -20511,7 +20550,7 @@
               <a:buFont typeface="Noto Sans Symbols"/>
               <a:buNone/>
             </a:pPr>
-            <a:endParaRPr sz="2000" b="0" i="0" u="none">
+            <a:endParaRPr sz="2000" b="0" i="0" u="none" dirty="0">
               <a:solidFill>
                 <a:schemeClr val="dk1"/>
               </a:solidFill>
@@ -20539,7 +20578,7 @@
               <a:buFont typeface="Noto Sans Symbols"/>
               <a:buNone/>
             </a:pPr>
-            <a:endParaRPr sz="2000" b="0" i="0" u="none">
+            <a:endParaRPr sz="2000" b="0" i="0" u="none" dirty="0">
               <a:solidFill>
                 <a:schemeClr val="dk1"/>
               </a:solidFill>
@@ -20567,7 +20606,7 @@
               <a:buFont typeface="Noto Sans Symbols"/>
               <a:buNone/>
             </a:pPr>
-            <a:endParaRPr sz="2000" b="0" i="0" u="none">
+            <a:endParaRPr sz="2000" b="0" i="0" u="none" dirty="0">
               <a:solidFill>
                 <a:schemeClr val="dk1"/>
               </a:solidFill>
@@ -20595,7 +20634,7 @@
               <a:buFont typeface="Noto Sans Symbols"/>
               <a:buNone/>
             </a:pPr>
-            <a:endParaRPr sz="2000" b="0" i="0" u="none">
+            <a:endParaRPr sz="2000" b="0" i="0" u="none" dirty="0">
               <a:solidFill>
                 <a:schemeClr val="dk1"/>
               </a:solidFill>
@@ -20624,7 +20663,7 @@
               <a:buChar char="❑"/>
             </a:pPr>
             <a:r>
-              <a:rPr lang="en-US" sz="2000" b="0" i="0" u="none">
+              <a:rPr lang="en-US" sz="2000" b="0" i="0" u="none" dirty="0">
                 <a:solidFill>
                   <a:srgbClr val="FF0000"/>
                 </a:solidFill>
@@ -20635,7 +20674,7 @@
               </a:rPr>
               <a:t>What kind of this pooling?</a:t>
             </a:r>
-            <a:endParaRPr>
+            <a:endParaRPr dirty="0">
               <a:solidFill>
                 <a:srgbClr val="FF0000"/>
               </a:solidFill>
@@ -20946,7 +20985,7 @@
               <a:buFont typeface="Noto Sans Symbols"/>
               <a:buNone/>
             </a:pPr>
-            <a:endParaRPr sz="2000" b="0" i="0" u="none">
+            <a:endParaRPr sz="2000" b="0" i="0" u="none" dirty="0">
               <a:solidFill>
                 <a:schemeClr val="dk1"/>
               </a:solidFill>
@@ -20974,7 +21013,7 @@
               <a:buFont typeface="Noto Sans Symbols"/>
               <a:buNone/>
             </a:pPr>
-            <a:endParaRPr sz="2000" b="0" i="0" u="none">
+            <a:endParaRPr sz="2000" b="0" i="0" u="none" dirty="0">
               <a:solidFill>
                 <a:schemeClr val="dk1"/>
               </a:solidFill>
@@ -21002,7 +21041,7 @@
               <a:buFont typeface="Noto Sans Symbols"/>
               <a:buNone/>
             </a:pPr>
-            <a:endParaRPr sz="2000" b="0" i="0" u="none">
+            <a:endParaRPr sz="2000" b="0" i="0" u="none" dirty="0">
               <a:solidFill>
                 <a:schemeClr val="dk1"/>
               </a:solidFill>
@@ -21026,7 +21065,7 @@
               <a:buSzPts val="1200"/>
               <a:buNone/>
             </a:pPr>
-            <a:endParaRPr sz="2000" b="0" i="0" u="none">
+            <a:endParaRPr sz="2000" b="0" i="0" u="none" dirty="0">
               <a:solidFill>
                 <a:schemeClr val="dk1"/>
               </a:solidFill>
@@ -21049,7 +21088,7 @@
               </a:spcAft>
               <a:buNone/>
             </a:pPr>
-            <a:endParaRPr sz="1600"/>
+            <a:endParaRPr sz="1600" dirty="0"/>
           </a:p>
           <a:p>
             <a:pPr marL="742950" lvl="1" indent="-285750" algn="l" rtl="0">
@@ -21070,7 +21109,7 @@
               <a:buChar char="■"/>
             </a:pPr>
             <a:r>
-              <a:rPr lang="en-US" sz="1600" b="0" i="0" u="none">
+              <a:rPr lang="en-US" sz="1600" b="0" i="0" u="none" dirty="0">
                 <a:solidFill>
                   <a:schemeClr val="dk1"/>
                 </a:solidFill>
@@ -21079,9 +21118,33 @@
                 <a:cs typeface="Tahoma"/>
                 <a:sym typeface="Tahoma"/>
               </a:rPr>
-              <a:t>We're asking keras to generate 64 filters. </a:t>
+              <a:t>We're asking </a:t>
             </a:r>
-            <a:endParaRPr/>
+            <a:r>
+              <a:rPr lang="en-US" sz="1600" b="0" i="0" u="none" dirty="0" err="1">
+                <a:solidFill>
+                  <a:schemeClr val="dk1"/>
+                </a:solidFill>
+                <a:latin typeface="Tahoma"/>
+                <a:ea typeface="Tahoma"/>
+                <a:cs typeface="Tahoma"/>
+                <a:sym typeface="Tahoma"/>
+              </a:rPr>
+              <a:t>keras</a:t>
+            </a:r>
+            <a:r>
+              <a:rPr lang="en-US" sz="1600" b="0" i="0" u="none" dirty="0">
+                <a:solidFill>
+                  <a:schemeClr val="dk1"/>
+                </a:solidFill>
+                <a:latin typeface="Tahoma"/>
+                <a:ea typeface="Tahoma"/>
+                <a:cs typeface="Tahoma"/>
+                <a:sym typeface="Tahoma"/>
+              </a:rPr>
+              <a:t> to generate 64 filters. </a:t>
+            </a:r>
+            <a:endParaRPr dirty="0"/>
           </a:p>
           <a:p>
             <a:pPr marL="742950" lvl="1" indent="-285750" algn="l" rtl="0">
@@ -21102,7 +21165,7 @@
               <a:buChar char="■"/>
             </a:pPr>
             <a:r>
-              <a:rPr lang="en-US" sz="1600" b="0" i="0" u="none">
+              <a:rPr lang="en-US" sz="1600" b="0" i="0" u="none" dirty="0">
                 <a:solidFill>
                   <a:schemeClr val="dk1"/>
                 </a:solidFill>
@@ -21113,7 +21176,7 @@
               </a:rPr>
               <a:t>These filters are 3 by 3</a:t>
             </a:r>
-            <a:endParaRPr/>
+            <a:endParaRPr dirty="0"/>
           </a:p>
           <a:p>
             <a:pPr marL="742950" lvl="1" indent="-285750" algn="l" rtl="0">
@@ -21134,7 +21197,7 @@
               <a:buChar char="■"/>
             </a:pPr>
             <a:r>
-              <a:rPr lang="en-US" sz="1600" b="0" i="0" u="none">
+              <a:rPr lang="en-US" sz="1600" b="0" i="0" u="none" dirty="0">
                 <a:solidFill>
                   <a:schemeClr val="dk1"/>
                 </a:solidFill>
@@ -21143,14 +21206,26 @@
                 <a:cs typeface="Tahoma"/>
                 <a:sym typeface="Tahoma"/>
               </a:rPr>
-              <a:t>Their activation is relu</a:t>
+              <a:t>Their activation is </a:t>
             </a:r>
             <a:r>
-              <a:rPr lang="en-US" sz="1600"/>
+              <a:rPr lang="en-US" sz="1600" b="0" i="0" u="none" dirty="0" err="1">
+                <a:solidFill>
+                  <a:schemeClr val="dk1"/>
+                </a:solidFill>
+                <a:latin typeface="Tahoma"/>
+                <a:ea typeface="Tahoma"/>
+                <a:cs typeface="Tahoma"/>
+                <a:sym typeface="Tahoma"/>
+              </a:rPr>
+              <a:t>relu</a:t>
+            </a:r>
+            <a:r>
+              <a:rPr lang="en-US" sz="1600" dirty="0"/>
               <a:t>→</a:t>
             </a:r>
             <a:r>
-              <a:rPr lang="en-US" sz="1600" b="0" i="0" u="none">
+              <a:rPr lang="en-US" sz="1600" b="0" i="0" u="none" dirty="0">
                 <a:solidFill>
                   <a:schemeClr val="dk1"/>
                 </a:solidFill>
@@ -21161,7 +21236,7 @@
               </a:rPr>
               <a:t> the negative values will be thrown way</a:t>
             </a:r>
-            <a:endParaRPr/>
+            <a:endParaRPr dirty="0"/>
           </a:p>
           <a:p>
             <a:pPr marL="742950" lvl="1" indent="-285750" algn="l" rtl="0">
@@ -21182,7 +21257,7 @@
               <a:buChar char="■"/>
             </a:pPr>
             <a:r>
-              <a:rPr lang="en-US" sz="1600" b="0" i="0" u="none">
+              <a:rPr lang="en-US" sz="1600" b="0" i="0" u="none" dirty="0">
                 <a:solidFill>
                   <a:schemeClr val="dk1"/>
                 </a:solidFill>
@@ -21193,7 +21268,7 @@
               </a:rPr>
               <a:t>The input shape is as before, the 28 by 28. </a:t>
             </a:r>
-            <a:endParaRPr/>
+            <a:endParaRPr dirty="0"/>
           </a:p>
           <a:p>
             <a:pPr marL="742950" lvl="1" indent="-285750" algn="l" rtl="0">
@@ -21214,7 +21289,7 @@
               <a:buChar char="■"/>
             </a:pPr>
             <a:r>
-              <a:rPr lang="en-US" sz="1600" b="0" i="0" u="none">
+              <a:rPr lang="en-US" sz="1600" b="0" i="0" u="none" dirty="0">
                 <a:solidFill>
                   <a:schemeClr val="dk1"/>
                 </a:solidFill>
@@ -21225,7 +21300,7 @@
               </a:rPr>
               <a:t>That extra 1 just means that we are tallying using a single byte for color depth. </a:t>
             </a:r>
-            <a:endParaRPr/>
+            <a:endParaRPr dirty="0"/>
           </a:p>
         </p:txBody>
       </p:sp>

</xml_diff>